<commit_message>
Update SSE Upgrade Solution
</commit_message>
<xml_diff>
--- a/customers/上交所/陆家嘴系统2015年扩容补充说明.pptx
+++ b/customers/上交所/陆家嘴系统2015年扩容补充说明.pptx
@@ -142,6 +142,46 @@
       </a:defRPr>
     </a:lvl9pPr>
   </p:defaultTextStyle>
+  <p:extLst>
+    <p:ext uri="{EFAFB233-063F-42B5-8137-9DF3F51BA10A}">
+      <p15:sldGuideLst xmlns:p15="http://schemas.microsoft.com/office/powerpoint/2012/main">
+        <p15:guide id="1" orient="horz" pos="2160">
+          <p15:clr>
+            <a:srgbClr val="A4A3A4"/>
+          </p15:clr>
+        </p15:guide>
+        <p15:guide id="2" pos="2880">
+          <p15:clr>
+            <a:srgbClr val="A4A3A4"/>
+          </p15:clr>
+        </p15:guide>
+        <p15:guide id="3" pos="1028">
+          <p15:clr>
+            <a:srgbClr val="A4A3A4"/>
+          </p15:clr>
+        </p15:guide>
+        <p15:guide id="4" pos="1764">
+          <p15:clr>
+            <a:srgbClr val="A4A3A4"/>
+          </p15:clr>
+        </p15:guide>
+      </p15:sldGuideLst>
+    </p:ext>
+    <p:ext uri="{2D200454-40CA-4A62-9FC3-DE9A4176ACB9}">
+      <p15:notesGuideLst xmlns:p15="http://schemas.microsoft.com/office/powerpoint/2012/main">
+        <p15:guide id="1" orient="horz" pos="3127">
+          <p15:clr>
+            <a:srgbClr val="A4A3A4"/>
+          </p15:clr>
+        </p15:guide>
+        <p15:guide id="2" pos="2141">
+          <p15:clr>
+            <a:srgbClr val="A4A3A4"/>
+          </p15:clr>
+        </p15:guide>
+      </p15:notesGuideLst>
+    </p:ext>
+  </p:extLst>
 </p:presentation>
 </file>
 
@@ -10964,17 +11004,17 @@
                 <a:latin typeface="微软雅黑" panose="020B0503020204020204" pitchFamily="34" charset="-122"/>
                 <a:ea typeface="微软雅黑" panose="020B0503020204020204" pitchFamily="34" charset="-122"/>
               </a:rPr>
-              <a:t>年扩</a:t>
+              <a:t>年</a:t>
             </a:r>
             <a:r>
               <a:rPr lang="zh-CN" altLang="en-US" dirty="0" smtClean="0">
                 <a:latin typeface="微软雅黑" panose="020B0503020204020204" pitchFamily="34" charset="-122"/>
                 <a:ea typeface="微软雅黑" panose="020B0503020204020204" pitchFamily="34" charset="-122"/>
               </a:rPr>
-              <a:t>容</a:t>
-            </a:r>
-            <a:r>
-              <a:rPr lang="zh-CN" altLang="en-US" dirty="0">
+              <a:t>改造</a:t>
+            </a:r>
+            <a:r>
+              <a:rPr lang="zh-CN" altLang="en-US" dirty="0" smtClean="0">
                 <a:latin typeface="微软雅黑" panose="020B0503020204020204" pitchFamily="34" charset="-122"/>
                 <a:ea typeface="微软雅黑" panose="020B0503020204020204" pitchFamily="34" charset="-122"/>
               </a:rPr>
@@ -10985,14 +11025,7 @@
                 <a:latin typeface="微软雅黑" panose="020B0503020204020204" pitchFamily="34" charset="-122"/>
                 <a:ea typeface="微软雅黑" panose="020B0503020204020204" pitchFamily="34" charset="-122"/>
               </a:rPr>
-              <a:t>说</a:t>
-            </a:r>
-            <a:r>
-              <a:rPr lang="zh-CN" altLang="en-US" dirty="0" smtClean="0">
-                <a:latin typeface="微软雅黑" panose="020B0503020204020204" pitchFamily="34" charset="-122"/>
-                <a:ea typeface="微软雅黑" panose="020B0503020204020204" pitchFamily="34" charset="-122"/>
-              </a:rPr>
-              <a:t>明</a:t>
+              <a:t>说明</a:t>
             </a:r>
             <a:endParaRPr lang="zh-CN" altLang="en-US" dirty="0">
               <a:latin typeface="微软雅黑" panose="020B0503020204020204" pitchFamily="34" charset="-122"/>
@@ -12205,21 +12238,7 @@
                           <a:latin typeface="Century Gothic" panose="020B0502020202020204" pitchFamily="34" charset="0"/>
                           <a:ea typeface="微软雅黑" pitchFamily="34" charset="-122"/>
                         </a:rPr>
-                        <a:t>利</a:t>
-                      </a:r>
-                      <a:r>
-                        <a:rPr kumimoji="0" lang="zh-CN" altLang="en-US" sz="1400" b="0" i="0" u="none" strike="noStrike" cap="none" normalizeH="0" baseline="0" dirty="0" smtClean="0">
-                          <a:ln>
-                            <a:noFill/>
-                          </a:ln>
-                          <a:solidFill>
-                            <a:schemeClr val="tx1"/>
-                          </a:solidFill>
-                          <a:effectLst/>
-                          <a:latin typeface="Century Gothic" panose="020B0502020202020204" pitchFamily="34" charset="0"/>
-                          <a:ea typeface="微软雅黑" pitchFamily="34" charset="-122"/>
-                        </a:rPr>
-                        <a:t>旧</a:t>
+                        <a:t>利旧</a:t>
                       </a:r>
                       <a:r>
                         <a:rPr kumimoji="0" lang="en-US" altLang="zh-CN" sz="1400" b="0" i="0" u="none" strike="noStrike" cap="none" normalizeH="0" baseline="0" dirty="0" smtClean="0">
@@ -12247,21 +12266,7 @@
                           <a:latin typeface="Century Gothic" panose="020B0502020202020204" pitchFamily="34" charset="0"/>
                           <a:ea typeface="微软雅黑" pitchFamily="34" charset="-122"/>
                         </a:rPr>
-                        <a:t>块硬</a:t>
-                      </a:r>
-                      <a:r>
-                        <a:rPr kumimoji="0" lang="zh-CN" altLang="en-US" sz="1400" b="0" i="0" u="none" strike="noStrike" cap="none" normalizeH="0" baseline="0" dirty="0" smtClean="0">
-                          <a:ln>
-                            <a:noFill/>
-                          </a:ln>
-                          <a:solidFill>
-                            <a:schemeClr val="tx1"/>
-                          </a:solidFill>
-                          <a:effectLst/>
-                          <a:latin typeface="Century Gothic" panose="020B0502020202020204" pitchFamily="34" charset="0"/>
-                          <a:ea typeface="微软雅黑" pitchFamily="34" charset="-122"/>
-                        </a:rPr>
-                        <a:t>盘</a:t>
+                        <a:t>块硬盘</a:t>
                       </a:r>
                       <a:endParaRPr kumimoji="0" lang="en-US" altLang="zh-CN" sz="1400" b="0" i="0" u="none" strike="noStrike" cap="none" normalizeH="0" baseline="0" dirty="0" smtClean="0">
                         <a:ln>
@@ -13333,8 +13338,8 @@
         </p:nvSpPr>
         <p:spPr>
           <a:xfrm>
-            <a:off x="2264736" y="5442705"/>
-            <a:ext cx="4540103" cy="851770"/>
+            <a:off x="2264736" y="5442704"/>
+            <a:ext cx="4540103" cy="946521"/>
           </a:xfrm>
           <a:prstGeom prst="wedgeEllipseCallout">
             <a:avLst>
@@ -13388,8 +13393,85 @@
                 <a:latin typeface="微软雅黑" panose="020B0503020204020204" pitchFamily="34" charset="-122"/>
                 <a:ea typeface="微软雅黑" panose="020B0503020204020204" pitchFamily="34" charset="-122"/>
               </a:rPr>
-              <a:t>注：计算节点未扩充，仅基于现有计算能力进行了最大程度的存储扩充</a:t>
-            </a:r>
+              <a:t>注：</a:t>
+            </a:r>
+            <a:r>
+              <a:rPr lang="zh-CN" altLang="en-US" sz="1400" b="1" kern="0" dirty="0" smtClean="0">
+                <a:solidFill>
+                  <a:prstClr val="white"/>
+                </a:solidFill>
+                <a:latin typeface="微软雅黑" panose="020B0503020204020204" pitchFamily="34" charset="-122"/>
+                <a:ea typeface="微软雅黑" panose="020B0503020204020204" pitchFamily="34" charset="-122"/>
+              </a:rPr>
+              <a:t>本次改造已</a:t>
+            </a:r>
+            <a:r>
+              <a:rPr lang="zh-CN" altLang="en-US" sz="1400" b="1" kern="0" dirty="0" smtClean="0">
+                <a:solidFill>
+                  <a:prstClr val="white"/>
+                </a:solidFill>
+                <a:latin typeface="微软雅黑" panose="020B0503020204020204" pitchFamily="34" charset="-122"/>
+                <a:ea typeface="微软雅黑" panose="020B0503020204020204" pitchFamily="34" charset="-122"/>
+              </a:rPr>
+              <a:t>进行</a:t>
+            </a:r>
+            <a:r>
+              <a:rPr lang="zh-CN" altLang="en-US" sz="1400" b="1" kern="0" dirty="0" smtClean="0">
+                <a:solidFill>
+                  <a:prstClr val="white"/>
+                </a:solidFill>
+                <a:latin typeface="微软雅黑" panose="020B0503020204020204" pitchFamily="34" charset="-122"/>
+                <a:ea typeface="微软雅黑" panose="020B0503020204020204" pitchFamily="34" charset="-122"/>
+              </a:rPr>
+              <a:t>了最大</a:t>
+            </a:r>
+            <a:r>
+              <a:rPr lang="zh-CN" altLang="en-US" sz="1400" b="1" kern="0" dirty="0" smtClean="0">
+                <a:solidFill>
+                  <a:prstClr val="white"/>
+                </a:solidFill>
+                <a:latin typeface="微软雅黑" panose="020B0503020204020204" pitchFamily="34" charset="-122"/>
+                <a:ea typeface="微软雅黑" panose="020B0503020204020204" pitchFamily="34" charset="-122"/>
+              </a:rPr>
+              <a:t>程度</a:t>
+            </a:r>
+            <a:r>
+              <a:rPr lang="zh-CN" altLang="en-US" sz="1400" b="1" kern="0" dirty="0" smtClean="0">
+                <a:solidFill>
+                  <a:prstClr val="white"/>
+                </a:solidFill>
+                <a:latin typeface="微软雅黑" panose="020B0503020204020204" pitchFamily="34" charset="-122"/>
+                <a:ea typeface="微软雅黑" panose="020B0503020204020204" pitchFamily="34" charset="-122"/>
+              </a:rPr>
+              <a:t>地使用了陆家嘴平台的</a:t>
+            </a:r>
+            <a:r>
+              <a:rPr lang="zh-CN" altLang="en-US" sz="1400" b="1" kern="0" dirty="0" smtClean="0">
+                <a:solidFill>
+                  <a:prstClr val="white"/>
+                </a:solidFill>
+                <a:latin typeface="微软雅黑" panose="020B0503020204020204" pitchFamily="34" charset="-122"/>
+                <a:ea typeface="微软雅黑" panose="020B0503020204020204" pitchFamily="34" charset="-122"/>
+              </a:rPr>
+              <a:t>存储能扩展能力和设备</a:t>
+            </a:r>
+            <a:r>
+              <a:rPr lang="zh-CN" altLang="en-US" sz="1400" b="1" kern="0" dirty="0" smtClean="0">
+                <a:solidFill>
+                  <a:prstClr val="white"/>
+                </a:solidFill>
+                <a:latin typeface="微软雅黑" panose="020B0503020204020204" pitchFamily="34" charset="-122"/>
+                <a:ea typeface="微软雅黑" panose="020B0503020204020204" pitchFamily="34" charset="-122"/>
+              </a:rPr>
+              <a:t>利旧</a:t>
+            </a:r>
+            <a:endParaRPr lang="zh-CN" altLang="en-US" sz="1400" b="1" kern="0" dirty="0" smtClean="0">
+              <a:solidFill>
+                <a:prstClr val="white"/>
+              </a:solidFill>
+              <a:latin typeface="微软雅黑" panose="020B0503020204020204" pitchFamily="34" charset="-122"/>
+              <a:ea typeface="微软雅黑" panose="020B0503020204020204" pitchFamily="34" charset="-122"/>
+            </a:endParaRPr>
           </a:p>
         </p:txBody>
       </p:sp>
@@ -13714,8 +13796,8 @@
         </p:nvSpPr>
         <p:spPr>
           <a:xfrm>
-            <a:off x="7712143" y="1415186"/>
-            <a:ext cx="1169581" cy="678187"/>
+            <a:off x="7473761" y="873181"/>
+            <a:ext cx="1566524" cy="1086376"/>
           </a:xfrm>
           <a:prstGeom prst="wedgeRoundRectCallout">
             <a:avLst>
@@ -13730,17 +13812,19 @@
           </a:ln>
         </p:spPr>
         <p:style>
-          <a:lnRef idx="1">
-            <a:schemeClr val="dk1"/>
+          <a:lnRef idx="2">
+            <a:schemeClr val="accent1">
+              <a:shade val="50000"/>
+            </a:schemeClr>
           </a:lnRef>
-          <a:fillRef idx="2">
-            <a:schemeClr val="dk1"/>
+          <a:fillRef idx="1">
+            <a:schemeClr val="accent1"/>
           </a:fillRef>
-          <a:effectRef idx="1">
-            <a:schemeClr val="dk1"/>
+          <a:effectRef idx="0">
+            <a:schemeClr val="accent1"/>
           </a:effectRef>
           <a:fontRef idx="minor">
-            <a:schemeClr val="dk1"/>
+            <a:schemeClr val="lt1"/>
           </a:fontRef>
         </p:style>
         <p:txBody>
@@ -13753,11 +13837,9 @@
           <a:lstStyle/>
           <a:p>
             <a:r>
-              <a:rPr lang="zh-CN" altLang="en-US" sz="1000" kern="0" dirty="0">
-                <a:solidFill>
-                  <a:schemeClr val="tx1">
-                    <a:lumMod val="50000"/>
-                  </a:schemeClr>
+              <a:rPr lang="zh-CN" altLang="en-US" sz="1400" kern="0" dirty="0">
+                <a:solidFill>
+                  <a:schemeClr val="bg1"/>
                 </a:solidFill>
                 <a:latin typeface="微软雅黑" panose="020B0503020204020204" pitchFamily="34" charset="-122"/>
                 <a:ea typeface="微软雅黑" panose="020B0503020204020204" pitchFamily="34" charset="-122"/>
@@ -13765,11 +13847,9 @@
               <a:t>按</a:t>
             </a:r>
             <a:r>
-              <a:rPr lang="zh-CN" altLang="en-US" sz="1000" kern="0" dirty="0" smtClean="0">
-                <a:solidFill>
-                  <a:schemeClr val="tx1">
-                    <a:lumMod val="50000"/>
-                  </a:schemeClr>
+              <a:rPr lang="zh-CN" altLang="en-US" sz="1400" kern="0" dirty="0" smtClean="0">
+                <a:solidFill>
+                  <a:schemeClr val="bg1"/>
                 </a:solidFill>
                 <a:latin typeface="微软雅黑" panose="020B0503020204020204" pitchFamily="34" charset="-122"/>
                 <a:ea typeface="微软雅黑" panose="020B0503020204020204" pitchFamily="34" charset="-122"/>
@@ -13777,11 +13857,9 @@
               <a:t>照日交易金额</a:t>
             </a:r>
             <a:r>
-              <a:rPr lang="en-US" altLang="zh-CN" sz="1000" kern="0" dirty="0" smtClean="0">
-                <a:solidFill>
-                  <a:schemeClr val="tx1">
-                    <a:lumMod val="50000"/>
-                  </a:schemeClr>
+              <a:rPr lang="en-US" altLang="zh-CN" sz="1400" kern="0" dirty="0" smtClean="0">
+                <a:solidFill>
+                  <a:schemeClr val="bg1"/>
                 </a:solidFill>
                 <a:latin typeface="微软雅黑" panose="020B0503020204020204" pitchFamily="34" charset="-122"/>
                 <a:ea typeface="微软雅黑" panose="020B0503020204020204" pitchFamily="34" charset="-122"/>
@@ -13789,11 +13867,9 @@
               <a:t>3000</a:t>
             </a:r>
             <a:r>
-              <a:rPr lang="zh-CN" altLang="en-US" sz="1000" kern="0" dirty="0" smtClean="0">
-                <a:solidFill>
-                  <a:schemeClr val="tx1">
-                    <a:lumMod val="50000"/>
-                  </a:schemeClr>
+              <a:rPr lang="zh-CN" altLang="en-US" sz="1400" kern="0" dirty="0" smtClean="0">
+                <a:solidFill>
+                  <a:schemeClr val="bg1"/>
                 </a:solidFill>
                 <a:latin typeface="微软雅黑" panose="020B0503020204020204" pitchFamily="34" charset="-122"/>
                 <a:ea typeface="微软雅黑" panose="020B0503020204020204" pitchFamily="34" charset="-122"/>
@@ -13801,11 +13877,9 @@
               <a:t>亿计算，预计</a:t>
             </a:r>
             <a:r>
-              <a:rPr lang="en-US" altLang="zh-CN" sz="1000" kern="0" dirty="0" smtClean="0">
-                <a:solidFill>
-                  <a:schemeClr val="tx1">
-                    <a:lumMod val="50000"/>
-                  </a:schemeClr>
+              <a:rPr lang="en-US" altLang="zh-CN" sz="1400" b="1" i="1" kern="0" dirty="0" smtClean="0">
+                <a:solidFill>
+                  <a:srgbClr val="FF0000"/>
                 </a:solidFill>
                 <a:latin typeface="微软雅黑" panose="020B0503020204020204" pitchFamily="34" charset="-122"/>
                 <a:ea typeface="微软雅黑" panose="020B0503020204020204" pitchFamily="34" charset="-122"/>
@@ -13813,11 +13887,9 @@
               <a:t>2017</a:t>
             </a:r>
             <a:r>
-              <a:rPr lang="zh-CN" altLang="en-US" sz="1000" kern="0" dirty="0" smtClean="0">
-                <a:solidFill>
-                  <a:schemeClr val="tx1">
-                    <a:lumMod val="50000"/>
-                  </a:schemeClr>
+              <a:rPr lang="zh-CN" altLang="en-US" sz="1400" b="1" i="1" kern="0" dirty="0" smtClean="0">
+                <a:solidFill>
+                  <a:srgbClr val="FF0000"/>
                 </a:solidFill>
                 <a:latin typeface="微软雅黑" panose="020B0503020204020204" pitchFamily="34" charset="-122"/>
                 <a:ea typeface="微软雅黑" panose="020B0503020204020204" pitchFamily="34" charset="-122"/>
@@ -13825,11 +13897,9 @@
               <a:t>年</a:t>
             </a:r>
             <a:r>
-              <a:rPr lang="en-US" altLang="zh-CN" sz="1000" kern="0" dirty="0" smtClean="0">
-                <a:solidFill>
-                  <a:schemeClr val="tx1">
-                    <a:lumMod val="50000"/>
-                  </a:schemeClr>
+              <a:rPr lang="en-US" altLang="zh-CN" sz="1400" b="1" i="1" kern="0" dirty="0" smtClean="0">
+                <a:solidFill>
+                  <a:srgbClr val="FF0000"/>
                 </a:solidFill>
                 <a:latin typeface="微软雅黑" panose="020B0503020204020204" pitchFamily="34" charset="-122"/>
                 <a:ea typeface="微软雅黑" panose="020B0503020204020204" pitchFamily="34" charset="-122"/>
@@ -13837,22 +13907,28 @@
               <a:t>8</a:t>
             </a:r>
             <a:r>
-              <a:rPr lang="zh-CN" altLang="en-US" sz="1000" kern="0" dirty="0" smtClean="0">
-                <a:solidFill>
-                  <a:schemeClr val="tx1">
-                    <a:lumMod val="50000"/>
-                  </a:schemeClr>
+              <a:rPr lang="zh-CN" altLang="en-US" sz="1400" b="1" i="1" kern="0" dirty="0" smtClean="0">
+                <a:solidFill>
+                  <a:srgbClr val="FF0000"/>
                 </a:solidFill>
                 <a:latin typeface="微软雅黑" panose="020B0503020204020204" pitchFamily="34" charset="-122"/>
                 <a:ea typeface="微软雅黑" panose="020B0503020204020204" pitchFamily="34" charset="-122"/>
               </a:rPr>
-              <a:t>月到达空间上限</a:t>
-            </a:r>
-            <a:endParaRPr lang="en-US" altLang="zh-CN" sz="1000" kern="0" dirty="0" smtClean="0">
+              <a:t>月</a:t>
+            </a:r>
+            <a:r>
+              <a:rPr lang="zh-CN" altLang="en-US" sz="1400" kern="0" dirty="0" smtClean="0">
+                <a:solidFill>
+                  <a:schemeClr val="bg1"/>
+                </a:solidFill>
+                <a:latin typeface="微软雅黑" panose="020B0503020204020204" pitchFamily="34" charset="-122"/>
+                <a:ea typeface="微软雅黑" panose="020B0503020204020204" pitchFamily="34" charset="-122"/>
+              </a:rPr>
+              <a:t>到达空间上限</a:t>
+            </a:r>
+            <a:endParaRPr lang="en-US" altLang="zh-CN" sz="1400" kern="0" dirty="0" smtClean="0">
               <a:solidFill>
-                <a:schemeClr val="tx1">
-                  <a:lumMod val="50000"/>
-                </a:schemeClr>
+                <a:schemeClr val="bg1"/>
               </a:solidFill>
               <a:latin typeface="微软雅黑" panose="020B0503020204020204" pitchFamily="34" charset="-122"/>
               <a:ea typeface="微软雅黑" panose="020B0503020204020204" pitchFamily="34" charset="-122"/>
@@ -14674,8 +14750,8 @@
         </p:blipFill>
         <p:spPr bwMode="auto">
           <a:xfrm>
-            <a:off x="769026" y="1535250"/>
-            <a:ext cx="7594686" cy="4917890"/>
+            <a:off x="457200" y="1977478"/>
+            <a:ext cx="6592785" cy="4269115"/>
           </a:xfrm>
           <a:prstGeom prst="rect">
             <a:avLst/>
@@ -14725,7 +14801,12 @@
             <p:ph type="title"/>
           </p:nvPr>
         </p:nvSpPr>
-        <p:spPr/>
+        <p:spPr>
+          <a:xfrm>
+            <a:off x="457200" y="166689"/>
+            <a:ext cx="8229600" cy="435196"/>
+          </a:xfrm>
+        </p:spPr>
         <p:txBody>
           <a:bodyPr/>
           <a:lstStyle/>
@@ -14752,7 +14833,7 @@
         </p:nvSpPr>
         <p:spPr>
           <a:xfrm>
-            <a:off x="5085867" y="2286005"/>
+            <a:off x="4136743" y="2494349"/>
             <a:ext cx="2048582" cy="1180209"/>
           </a:xfrm>
           <a:prstGeom prst="wedgeRoundRectCallout">
@@ -14942,8 +15023,8 @@
         </p:nvSpPr>
         <p:spPr>
           <a:xfrm>
-            <a:off x="743650" y="1187478"/>
-            <a:ext cx="7645439" cy="297004"/>
+            <a:off x="457200" y="955554"/>
+            <a:ext cx="8096491" cy="881780"/>
           </a:xfrm>
           <a:prstGeom prst="rect">
             <a:avLst/>
@@ -14965,32 +15046,11 @@
               </a:spcBef>
             </a:pPr>
             <a:r>
-              <a:rPr lang="zh-CN" altLang="en-US" sz="1400" b="1" dirty="0" smtClean="0">
+              <a:rPr lang="zh-CN" altLang="en-US" b="1" dirty="0" smtClean="0">
                 <a:ln w="1905"/>
-                <a:gradFill>
-                  <a:gsLst>
-                    <a:gs pos="0">
-                      <a:schemeClr val="accent6">
-                        <a:shade val="20000"/>
-                        <a:satMod val="200000"/>
-                      </a:schemeClr>
-                    </a:gs>
-                    <a:gs pos="78000">
-                      <a:schemeClr val="accent6">
-                        <a:tint val="90000"/>
-                        <a:shade val="89000"/>
-                        <a:satMod val="220000"/>
-                      </a:schemeClr>
-                    </a:gs>
-                    <a:gs pos="100000">
-                      <a:schemeClr val="accent6">
-                        <a:tint val="12000"/>
-                        <a:satMod val="255000"/>
-                      </a:schemeClr>
-                    </a:gs>
-                  </a:gsLst>
-                  <a:lin ang="5400000"/>
-                </a:gradFill>
+                <a:solidFill>
+                  <a:srgbClr val="FF0000"/>
+                </a:solidFill>
                 <a:effectLst>
                   <a:innerShdw blurRad="69850" dist="43180" dir="5400000">
                     <a:srgbClr val="000000">
@@ -15001,35 +15061,140 @@
                 <a:latin typeface="微软雅黑" panose="020B0503020204020204" pitchFamily="34" charset="-122"/>
                 <a:ea typeface="微软雅黑" panose="020B0503020204020204" pitchFamily="34" charset="-122"/>
               </a:rPr>
-              <a:t>注：</a:t>
-            </a:r>
-            <a:r>
-              <a:rPr lang="en-US" altLang="zh-CN" sz="1400" b="1" dirty="0" smtClean="0">
+              <a:t>数据日增量说明：虽然当前交易量在</a:t>
+            </a:r>
+            <a:r>
+              <a:rPr lang="en-US" altLang="zh-CN" b="1" dirty="0" smtClean="0">
                 <a:ln w="1905"/>
-                <a:gradFill>
-                  <a:gsLst>
-                    <a:gs pos="0">
-                      <a:schemeClr val="accent6">
-                        <a:shade val="20000"/>
-                        <a:satMod val="200000"/>
-                      </a:schemeClr>
-                    </a:gs>
-                    <a:gs pos="78000">
-                      <a:schemeClr val="accent6">
-                        <a:tint val="90000"/>
-                        <a:shade val="89000"/>
-                        <a:satMod val="220000"/>
-                      </a:schemeClr>
-                    </a:gs>
-                    <a:gs pos="100000">
-                      <a:schemeClr val="accent6">
-                        <a:tint val="12000"/>
-                        <a:satMod val="255000"/>
-                      </a:schemeClr>
-                    </a:gs>
-                  </a:gsLst>
-                  <a:lin ang="5400000"/>
-                </a:gradFill>
+                <a:solidFill>
+                  <a:srgbClr val="FF0000"/>
+                </a:solidFill>
+                <a:effectLst>
+                  <a:innerShdw blurRad="69850" dist="43180" dir="5400000">
+                    <a:srgbClr val="000000">
+                      <a:alpha val="65000"/>
+                    </a:srgbClr>
+                  </a:innerShdw>
+                </a:effectLst>
+                <a:latin typeface="微软雅黑" panose="020B0503020204020204" pitchFamily="34" charset="-122"/>
+                <a:ea typeface="微软雅黑" panose="020B0503020204020204" pitchFamily="34" charset="-122"/>
+              </a:rPr>
+              <a:t>2000-3000</a:t>
+            </a:r>
+            <a:r>
+              <a:rPr lang="zh-CN" altLang="en-US" b="1" dirty="0" smtClean="0">
+                <a:ln w="1905"/>
+                <a:solidFill>
+                  <a:srgbClr val="FF0000"/>
+                </a:solidFill>
+                <a:effectLst>
+                  <a:innerShdw blurRad="69850" dist="43180" dir="5400000">
+                    <a:srgbClr val="000000">
+                      <a:alpha val="65000"/>
+                    </a:srgbClr>
+                  </a:innerShdw>
+                </a:effectLst>
+                <a:latin typeface="微软雅黑" panose="020B0503020204020204" pitchFamily="34" charset="-122"/>
+                <a:ea typeface="微软雅黑" panose="020B0503020204020204" pitchFamily="34" charset="-122"/>
+              </a:rPr>
+              <a:t>亿</a:t>
+            </a:r>
+            <a:r>
+              <a:rPr lang="zh-CN" altLang="en-US" b="1" dirty="0" smtClean="0">
+                <a:ln w="1905"/>
+                <a:solidFill>
+                  <a:srgbClr val="FF0000"/>
+                </a:solidFill>
+                <a:effectLst>
+                  <a:innerShdw blurRad="69850" dist="43180" dir="5400000">
+                    <a:srgbClr val="000000">
+                      <a:alpha val="65000"/>
+                    </a:srgbClr>
+                  </a:innerShdw>
+                </a:effectLst>
+                <a:latin typeface="微软雅黑" panose="020B0503020204020204" pitchFamily="34" charset="-122"/>
+                <a:ea typeface="微软雅黑" panose="020B0503020204020204" pitchFamily="34" charset="-122"/>
+              </a:rPr>
+              <a:t>之间，但是数据日增长量已经超过</a:t>
+            </a:r>
+            <a:r>
+              <a:rPr lang="en-US" altLang="zh-CN" b="1" dirty="0" smtClean="0">
+                <a:ln w="1905"/>
+                <a:solidFill>
+                  <a:srgbClr val="FF0000"/>
+                </a:solidFill>
+                <a:effectLst>
+                  <a:innerShdw blurRad="69850" dist="43180" dir="5400000">
+                    <a:srgbClr val="000000">
+                      <a:alpha val="65000"/>
+                    </a:srgbClr>
+                  </a:innerShdw>
+                </a:effectLst>
+                <a:latin typeface="微软雅黑" panose="020B0503020204020204" pitchFamily="34" charset="-122"/>
+                <a:ea typeface="微软雅黑" panose="020B0503020204020204" pitchFamily="34" charset="-122"/>
+              </a:rPr>
+              <a:t>2015</a:t>
+            </a:r>
+            <a:r>
+              <a:rPr lang="zh-CN" altLang="en-US" b="1" dirty="0" smtClean="0">
+                <a:ln w="1905"/>
+                <a:solidFill>
+                  <a:srgbClr val="FF0000"/>
+                </a:solidFill>
+                <a:effectLst>
+                  <a:innerShdw blurRad="69850" dist="43180" dir="5400000">
+                    <a:srgbClr val="000000">
+                      <a:alpha val="65000"/>
+                    </a:srgbClr>
+                  </a:innerShdw>
+                </a:effectLst>
+                <a:latin typeface="微软雅黑" panose="020B0503020204020204" pitchFamily="34" charset="-122"/>
+                <a:ea typeface="微软雅黑" panose="020B0503020204020204" pitchFamily="34" charset="-122"/>
+              </a:rPr>
+              <a:t>年时的日成交</a:t>
+            </a:r>
+            <a:r>
+              <a:rPr lang="en-US" altLang="zh-CN" b="1" dirty="0" smtClean="0">
+                <a:ln w="1905"/>
+                <a:solidFill>
+                  <a:srgbClr val="FF0000"/>
+                </a:solidFill>
+                <a:effectLst>
+                  <a:innerShdw blurRad="69850" dist="43180" dir="5400000">
+                    <a:srgbClr val="000000">
+                      <a:alpha val="65000"/>
+                    </a:srgbClr>
+                  </a:innerShdw>
+                </a:effectLst>
+                <a:latin typeface="微软雅黑" panose="020B0503020204020204" pitchFamily="34" charset="-122"/>
+                <a:ea typeface="微软雅黑" panose="020B0503020204020204" pitchFamily="34" charset="-122"/>
+              </a:rPr>
+              <a:t>8000</a:t>
+            </a:r>
+            <a:r>
+              <a:rPr lang="zh-CN" altLang="en-US" b="1" dirty="0" smtClean="0">
+                <a:ln w="1905"/>
+                <a:solidFill>
+                  <a:srgbClr val="FF0000"/>
+                </a:solidFill>
+                <a:effectLst>
+                  <a:innerShdw blurRad="69850" dist="43180" dir="5400000">
+                    <a:srgbClr val="000000">
+                      <a:alpha val="65000"/>
+                    </a:srgbClr>
+                  </a:innerShdw>
+                </a:effectLst>
+                <a:latin typeface="微软雅黑" panose="020B0503020204020204" pitchFamily="34" charset="-122"/>
+                <a:ea typeface="微软雅黑" panose="020B0503020204020204" pitchFamily="34" charset="-122"/>
+              </a:rPr>
+              <a:t>亿时期。</a:t>
+            </a:r>
+            <a:r>
+              <a:rPr lang="en-US" altLang="zh-CN" b="1" dirty="0" smtClean="0">
+                <a:ln w="1905"/>
+                <a:solidFill>
+                  <a:srgbClr val="FF0000"/>
+                </a:solidFill>
                 <a:effectLst>
                   <a:innerShdw blurRad="69850" dist="43180" dir="5400000">
                     <a:srgbClr val="000000">
@@ -15043,32 +15208,11 @@
               <a:t>2</a:t>
             </a:r>
             <a:r>
-              <a:rPr lang="en-US" sz="1400" b="1" dirty="0" smtClean="0">
+              <a:rPr lang="en-US" b="1" dirty="0" smtClean="0">
                 <a:ln w="1905"/>
-                <a:gradFill>
-                  <a:gsLst>
-                    <a:gs pos="0">
-                      <a:schemeClr val="accent6">
-                        <a:shade val="20000"/>
-                        <a:satMod val="200000"/>
-                      </a:schemeClr>
-                    </a:gs>
-                    <a:gs pos="78000">
-                      <a:schemeClr val="accent6">
-                        <a:tint val="90000"/>
-                        <a:shade val="89000"/>
-                        <a:satMod val="220000"/>
-                      </a:schemeClr>
-                    </a:gs>
-                    <a:gs pos="100000">
-                      <a:schemeClr val="accent6">
-                        <a:tint val="12000"/>
-                        <a:satMod val="255000"/>
-                      </a:schemeClr>
-                    </a:gs>
-                  </a:gsLst>
-                  <a:lin ang="5400000"/>
-                </a:gradFill>
+                <a:solidFill>
+                  <a:srgbClr val="FF0000"/>
+                </a:solidFill>
                 <a:effectLst>
                   <a:innerShdw blurRad="69850" dist="43180" dir="5400000">
                     <a:srgbClr val="000000">
@@ -15082,32 +15226,11 @@
               <a:t>017</a:t>
             </a:r>
             <a:r>
-              <a:rPr lang="zh-CN" altLang="en-US" sz="1400" b="1" dirty="0" smtClean="0">
+              <a:rPr lang="zh-CN" altLang="en-US" b="1" dirty="0" smtClean="0">
                 <a:ln w="1905"/>
-                <a:gradFill>
-                  <a:gsLst>
-                    <a:gs pos="0">
-                      <a:schemeClr val="accent6">
-                        <a:shade val="20000"/>
-                        <a:satMod val="200000"/>
-                      </a:schemeClr>
-                    </a:gs>
-                    <a:gs pos="78000">
-                      <a:schemeClr val="accent6">
-                        <a:tint val="90000"/>
-                        <a:shade val="89000"/>
-                        <a:satMod val="220000"/>
-                      </a:schemeClr>
-                    </a:gs>
-                    <a:gs pos="100000">
-                      <a:schemeClr val="accent6">
-                        <a:tint val="12000"/>
-                        <a:satMod val="255000"/>
-                      </a:schemeClr>
-                    </a:gs>
-                  </a:gsLst>
-                  <a:lin ang="5400000"/>
-                </a:gradFill>
+                <a:solidFill>
+                  <a:srgbClr val="FF0000"/>
+                </a:solidFill>
                 <a:effectLst>
                   <a:innerShdw blurRad="69850" dist="43180" dir="5400000">
                     <a:srgbClr val="000000">
@@ -15121,32 +15244,11 @@
               <a:t>年</a:t>
             </a:r>
             <a:r>
-              <a:rPr lang="zh-CN" altLang="en-US" sz="1400" b="1" dirty="0">
+              <a:rPr lang="zh-CN" altLang="en-US" b="1" dirty="0">
                 <a:ln w="1905"/>
-                <a:gradFill>
-                  <a:gsLst>
-                    <a:gs pos="0">
-                      <a:schemeClr val="accent6">
-                        <a:shade val="20000"/>
-                        <a:satMod val="200000"/>
-                      </a:schemeClr>
-                    </a:gs>
-                    <a:gs pos="78000">
-                      <a:schemeClr val="accent6">
-                        <a:tint val="90000"/>
-                        <a:shade val="89000"/>
-                        <a:satMod val="220000"/>
-                      </a:schemeClr>
-                    </a:gs>
-                    <a:gs pos="100000">
-                      <a:schemeClr val="accent6">
-                        <a:tint val="12000"/>
-                        <a:satMod val="255000"/>
-                      </a:schemeClr>
-                    </a:gs>
-                  </a:gsLst>
-                  <a:lin ang="5400000"/>
-                </a:gradFill>
+                <a:solidFill>
+                  <a:srgbClr val="FF0000"/>
+                </a:solidFill>
                 <a:effectLst>
                   <a:innerShdw blurRad="69850" dist="43180" dir="5400000">
                     <a:srgbClr val="000000">
@@ -15160,32 +15262,11 @@
               <a:t>初</a:t>
             </a:r>
             <a:r>
-              <a:rPr lang="zh-CN" altLang="en-US" sz="1400" b="1" dirty="0" smtClean="0">
+              <a:rPr lang="zh-CN" altLang="en-US" b="1" dirty="0" smtClean="0">
                 <a:ln w="1905"/>
-                <a:gradFill>
-                  <a:gsLst>
-                    <a:gs pos="0">
-                      <a:schemeClr val="accent6">
-                        <a:shade val="20000"/>
-                        <a:satMod val="200000"/>
-                      </a:schemeClr>
-                    </a:gs>
-                    <a:gs pos="78000">
-                      <a:schemeClr val="accent6">
-                        <a:tint val="90000"/>
-                        <a:shade val="89000"/>
-                        <a:satMod val="220000"/>
-                      </a:schemeClr>
-                    </a:gs>
-                    <a:gs pos="100000">
-                      <a:schemeClr val="accent6">
-                        <a:tint val="12000"/>
-                        <a:satMod val="255000"/>
-                      </a:schemeClr>
-                    </a:gs>
-                  </a:gsLst>
-                  <a:lin ang="5400000"/>
-                </a:gradFill>
+                <a:solidFill>
+                  <a:srgbClr val="FF0000"/>
+                </a:solidFill>
                 <a:effectLst>
                   <a:innerShdw blurRad="69850" dist="43180" dir="5400000">
                     <a:srgbClr val="000000">
@@ -15199,32 +15280,11 @@
               <a:t>日增量为</a:t>
             </a:r>
             <a:r>
-              <a:rPr lang="en-US" altLang="zh-CN" sz="1400" b="1" dirty="0" smtClean="0">
+              <a:rPr lang="en-US" altLang="zh-CN" b="1" dirty="0" smtClean="0">
                 <a:ln w="1905"/>
-                <a:gradFill>
-                  <a:gsLst>
-                    <a:gs pos="0">
-                      <a:schemeClr val="accent6">
-                        <a:shade val="20000"/>
-                        <a:satMod val="200000"/>
-                      </a:schemeClr>
-                    </a:gs>
-                    <a:gs pos="78000">
-                      <a:schemeClr val="accent6">
-                        <a:tint val="90000"/>
-                        <a:shade val="89000"/>
-                        <a:satMod val="220000"/>
-                      </a:schemeClr>
-                    </a:gs>
-                    <a:gs pos="100000">
-                      <a:schemeClr val="accent6">
-                        <a:tint val="12000"/>
-                        <a:satMod val="255000"/>
-                      </a:schemeClr>
-                    </a:gs>
-                  </a:gsLst>
-                  <a:lin ang="5400000"/>
-                </a:gradFill>
+                <a:solidFill>
+                  <a:srgbClr val="FF0000"/>
+                </a:solidFill>
                 <a:effectLst>
                   <a:innerShdw blurRad="69850" dist="43180" dir="5400000">
                     <a:srgbClr val="000000">
@@ -15238,32 +15298,11 @@
               <a:t>35GB</a:t>
             </a:r>
             <a:r>
-              <a:rPr lang="zh-CN" altLang="en-US" sz="1400" b="1" dirty="0" smtClean="0">
+              <a:rPr lang="zh-CN" altLang="en-US" b="1" dirty="0" smtClean="0">
                 <a:ln w="1905"/>
-                <a:gradFill>
-                  <a:gsLst>
-                    <a:gs pos="0">
-                      <a:schemeClr val="accent6">
-                        <a:shade val="20000"/>
-                        <a:satMod val="200000"/>
-                      </a:schemeClr>
-                    </a:gs>
-                    <a:gs pos="78000">
-                      <a:schemeClr val="accent6">
-                        <a:tint val="90000"/>
-                        <a:shade val="89000"/>
-                        <a:satMod val="220000"/>
-                      </a:schemeClr>
-                    </a:gs>
-                    <a:gs pos="100000">
-                      <a:schemeClr val="accent6">
-                        <a:tint val="12000"/>
-                        <a:satMod val="255000"/>
-                      </a:schemeClr>
-                    </a:gs>
-                  </a:gsLst>
-                  <a:lin ang="5400000"/>
-                </a:gradFill>
+                <a:solidFill>
+                  <a:srgbClr val="FF0000"/>
+                </a:solidFill>
                 <a:effectLst>
                   <a:innerShdw blurRad="69850" dist="43180" dir="5400000">
                     <a:srgbClr val="000000">
@@ -15277,32 +15316,11 @@
               <a:t>，比</a:t>
             </a:r>
             <a:r>
-              <a:rPr lang="en-US" altLang="zh-CN" sz="1400" b="1" dirty="0" smtClean="0">
+              <a:rPr lang="en-US" altLang="zh-CN" b="1" dirty="0" smtClean="0">
                 <a:ln w="1905"/>
-                <a:gradFill>
-                  <a:gsLst>
-                    <a:gs pos="0">
-                      <a:schemeClr val="accent6">
-                        <a:shade val="20000"/>
-                        <a:satMod val="200000"/>
-                      </a:schemeClr>
-                    </a:gs>
-                    <a:gs pos="78000">
-                      <a:schemeClr val="accent6">
-                        <a:tint val="90000"/>
-                        <a:shade val="89000"/>
-                        <a:satMod val="220000"/>
-                      </a:schemeClr>
-                    </a:gs>
-                    <a:gs pos="100000">
-                      <a:schemeClr val="accent6">
-                        <a:tint val="12000"/>
-                        <a:satMod val="255000"/>
-                      </a:schemeClr>
-                    </a:gs>
-                  </a:gsLst>
-                  <a:lin ang="5400000"/>
-                </a:gradFill>
+                <a:solidFill>
+                  <a:srgbClr val="FF0000"/>
+                </a:solidFill>
                 <a:effectLst>
                   <a:innerShdw blurRad="69850" dist="43180" dir="5400000">
                     <a:srgbClr val="000000">
@@ -15316,32 +15334,11 @@
               <a:t>2016</a:t>
             </a:r>
             <a:r>
-              <a:rPr lang="zh-CN" altLang="en-US" sz="1400" b="1" dirty="0" smtClean="0">
+              <a:rPr lang="zh-CN" altLang="en-US" b="1" dirty="0" smtClean="0">
                 <a:ln w="1905"/>
-                <a:gradFill>
-                  <a:gsLst>
-                    <a:gs pos="0">
-                      <a:schemeClr val="accent6">
-                        <a:shade val="20000"/>
-                        <a:satMod val="200000"/>
-                      </a:schemeClr>
-                    </a:gs>
-                    <a:gs pos="78000">
-                      <a:schemeClr val="accent6">
-                        <a:tint val="90000"/>
-                        <a:shade val="89000"/>
-                        <a:satMod val="220000"/>
-                      </a:schemeClr>
-                    </a:gs>
-                    <a:gs pos="100000">
-                      <a:schemeClr val="accent6">
-                        <a:tint val="12000"/>
-                        <a:satMod val="255000"/>
-                      </a:schemeClr>
-                    </a:gs>
-                  </a:gsLst>
-                  <a:lin ang="5400000"/>
-                </a:gradFill>
+                <a:solidFill>
+                  <a:srgbClr val="FF0000"/>
+                </a:solidFill>
                 <a:effectLst>
                   <a:innerShdw blurRad="69850" dist="43180" dir="5400000">
                     <a:srgbClr val="000000">
@@ -15355,32 +15352,11 @@
               <a:t>年</a:t>
             </a:r>
             <a:r>
-              <a:rPr lang="zh-CN" altLang="en-US" sz="1400" b="1" dirty="0">
+              <a:rPr lang="zh-CN" altLang="en-US" b="1" dirty="0">
                 <a:ln w="1905"/>
-                <a:gradFill>
-                  <a:gsLst>
-                    <a:gs pos="0">
-                      <a:schemeClr val="accent6">
-                        <a:shade val="20000"/>
-                        <a:satMod val="200000"/>
-                      </a:schemeClr>
-                    </a:gs>
-                    <a:gs pos="78000">
-                      <a:schemeClr val="accent6">
-                        <a:tint val="90000"/>
-                        <a:shade val="89000"/>
-                        <a:satMod val="220000"/>
-                      </a:schemeClr>
-                    </a:gs>
-                    <a:gs pos="100000">
-                      <a:schemeClr val="accent6">
-                        <a:tint val="12000"/>
-                        <a:satMod val="255000"/>
-                      </a:schemeClr>
-                    </a:gs>
-                  </a:gsLst>
-                  <a:lin ang="5400000"/>
-                </a:gradFill>
+                <a:solidFill>
+                  <a:srgbClr val="FF0000"/>
+                </a:solidFill>
                 <a:effectLst>
                   <a:innerShdw blurRad="69850" dist="43180" dir="5400000">
                     <a:srgbClr val="000000">
@@ -15394,32 +15370,11 @@
               <a:t>初</a:t>
             </a:r>
             <a:r>
-              <a:rPr lang="zh-CN" altLang="en-US" sz="1400" b="1" dirty="0" smtClean="0">
+              <a:rPr lang="zh-CN" altLang="en-US" b="1" dirty="0" smtClean="0">
                 <a:ln w="1905"/>
-                <a:gradFill>
-                  <a:gsLst>
-                    <a:gs pos="0">
-                      <a:schemeClr val="accent6">
-                        <a:shade val="20000"/>
-                        <a:satMod val="200000"/>
-                      </a:schemeClr>
-                    </a:gs>
-                    <a:gs pos="78000">
-                      <a:schemeClr val="accent6">
-                        <a:tint val="90000"/>
-                        <a:shade val="89000"/>
-                        <a:satMod val="220000"/>
-                      </a:schemeClr>
-                    </a:gs>
-                    <a:gs pos="100000">
-                      <a:schemeClr val="accent6">
-                        <a:tint val="12000"/>
-                        <a:satMod val="255000"/>
-                      </a:schemeClr>
-                    </a:gs>
-                  </a:gsLst>
-                  <a:lin ang="5400000"/>
-                </a:gradFill>
+                <a:solidFill>
+                  <a:srgbClr val="FF0000"/>
+                </a:solidFill>
                 <a:effectLst>
                   <a:innerShdw blurRad="69850" dist="43180" dir="5400000">
                     <a:srgbClr val="000000">
@@ -15433,32 +15388,11 @@
               <a:t>上升</a:t>
             </a:r>
             <a:r>
-              <a:rPr lang="en-US" altLang="zh-CN" sz="1400" b="1" dirty="0">
+              <a:rPr lang="en-US" altLang="zh-CN" b="1" dirty="0">
                 <a:ln w="1905"/>
-                <a:gradFill>
-                  <a:gsLst>
-                    <a:gs pos="0">
-                      <a:schemeClr val="accent6">
-                        <a:shade val="20000"/>
-                        <a:satMod val="200000"/>
-                      </a:schemeClr>
-                    </a:gs>
-                    <a:gs pos="78000">
-                      <a:schemeClr val="accent6">
-                        <a:tint val="90000"/>
-                        <a:shade val="89000"/>
-                        <a:satMod val="220000"/>
-                      </a:schemeClr>
-                    </a:gs>
-                    <a:gs pos="100000">
-                      <a:schemeClr val="accent6">
-                        <a:tint val="12000"/>
-                        <a:satMod val="255000"/>
-                      </a:schemeClr>
-                    </a:gs>
-                  </a:gsLst>
-                  <a:lin ang="5400000"/>
-                </a:gradFill>
+                <a:solidFill>
+                  <a:srgbClr val="FF0000"/>
+                </a:solidFill>
                 <a:effectLst>
                   <a:innerShdw blurRad="69850" dist="43180" dir="5400000">
                     <a:srgbClr val="000000">
@@ -15472,32 +15406,11 @@
               <a:t>4</a:t>
             </a:r>
             <a:r>
-              <a:rPr lang="en-US" altLang="zh-CN" sz="1400" b="1" dirty="0" smtClean="0">
+              <a:rPr lang="en-US" altLang="zh-CN" b="1" dirty="0" smtClean="0">
                 <a:ln w="1905"/>
-                <a:gradFill>
-                  <a:gsLst>
-                    <a:gs pos="0">
-                      <a:schemeClr val="accent6">
-                        <a:shade val="20000"/>
-                        <a:satMod val="200000"/>
-                      </a:schemeClr>
-                    </a:gs>
-                    <a:gs pos="78000">
-                      <a:schemeClr val="accent6">
-                        <a:tint val="90000"/>
-                        <a:shade val="89000"/>
-                        <a:satMod val="220000"/>
-                      </a:schemeClr>
-                    </a:gs>
-                    <a:gs pos="100000">
-                      <a:schemeClr val="accent6">
-                        <a:tint val="12000"/>
-                        <a:satMod val="255000"/>
-                      </a:schemeClr>
-                    </a:gs>
-                  </a:gsLst>
-                  <a:lin ang="5400000"/>
-                </a:gradFill>
+                <a:solidFill>
+                  <a:srgbClr val="FF0000"/>
+                </a:solidFill>
                 <a:effectLst>
                   <a:innerShdw blurRad="69850" dist="43180" dir="5400000">
                     <a:srgbClr val="000000">
@@ -15511,32 +15424,11 @@
               <a:t>0%</a:t>
             </a:r>
             <a:r>
-              <a:rPr lang="zh-CN" altLang="en-US" sz="1400" b="1" dirty="0" smtClean="0">
+              <a:rPr lang="zh-CN" altLang="en-US" b="1" dirty="0" smtClean="0">
                 <a:ln w="1905"/>
-                <a:gradFill>
-                  <a:gsLst>
-                    <a:gs pos="0">
-                      <a:schemeClr val="accent6">
-                        <a:shade val="20000"/>
-                        <a:satMod val="200000"/>
-                      </a:schemeClr>
-                    </a:gs>
-                    <a:gs pos="78000">
-                      <a:schemeClr val="accent6">
-                        <a:tint val="90000"/>
-                        <a:shade val="89000"/>
-                        <a:satMod val="220000"/>
-                      </a:schemeClr>
-                    </a:gs>
-                    <a:gs pos="100000">
-                      <a:schemeClr val="accent6">
-                        <a:tint val="12000"/>
-                        <a:satMod val="255000"/>
-                      </a:schemeClr>
-                    </a:gs>
-                  </a:gsLst>
-                  <a:lin ang="5400000"/>
-                </a:gradFill>
+                <a:solidFill>
+                  <a:srgbClr val="FF0000"/>
+                </a:solidFill>
                 <a:effectLst>
                   <a:innerShdw blurRad="69850" dist="43180" dir="5400000">
                     <a:srgbClr val="000000">
@@ -15549,7 +15441,7 @@
               </a:rPr>
               <a:t>，是受新增需求和业务发展双重影响所致</a:t>
             </a:r>
-            <a:endParaRPr lang="en-US" sz="1400" b="1" cap="all" dirty="0" smtClean="0">
+            <a:endParaRPr lang="en-US" b="1" cap="all" dirty="0" smtClean="0">
               <a:ln w="9000" cmpd="sng">
                 <a:solidFill>
                   <a:schemeClr val="accent4">
@@ -15559,34 +15451,9 @@
                 </a:solidFill>
                 <a:prstDash val="solid"/>
               </a:ln>
-              <a:gradFill>
-                <a:gsLst>
-                  <a:gs pos="0">
-                    <a:schemeClr val="accent4">
-                      <a:shade val="20000"/>
-                      <a:satMod val="245000"/>
-                    </a:schemeClr>
-                  </a:gs>
-                  <a:gs pos="43000">
-                    <a:schemeClr val="accent4">
-                      <a:satMod val="255000"/>
-                    </a:schemeClr>
-                  </a:gs>
-                  <a:gs pos="48000">
-                    <a:schemeClr val="accent4">
-                      <a:shade val="85000"/>
-                      <a:satMod val="255000"/>
-                    </a:schemeClr>
-                  </a:gs>
-                  <a:gs pos="100000">
-                    <a:schemeClr val="accent4">
-                      <a:shade val="20000"/>
-                      <a:satMod val="245000"/>
-                    </a:schemeClr>
-                  </a:gs>
-                </a:gsLst>
-                <a:lin ang="5400000"/>
-              </a:gradFill>
+              <a:solidFill>
+                <a:srgbClr val="FF0000"/>
+              </a:solidFill>
               <a:effectLst>
                 <a:reflection blurRad="12700" stA="28000" endPos="45000" dist="1000" dir="5400000" sy="-100000" algn="bl" rotWithShape="0"/>
               </a:effectLst>

</xml_diff>